<commit_message>
Futher work on roadtypes
</commit_message>
<xml_diff>
--- a/roadtypes.pptx
+++ b/roadtypes.pptx
@@ -36,6 +36,15 @@
     <p:sldId id="285" r:id="rId30"/>
     <p:sldId id="287" r:id="rId31"/>
     <p:sldId id="286" r:id="rId32"/>
+    <p:sldId id="288" r:id="rId33"/>
+    <p:sldId id="289" r:id="rId34"/>
+    <p:sldId id="290" r:id="rId35"/>
+    <p:sldId id="291" r:id="rId36"/>
+    <p:sldId id="292" r:id="rId37"/>
+    <p:sldId id="293" r:id="rId38"/>
+    <p:sldId id="294" r:id="rId39"/>
+    <p:sldId id="295" r:id="rId40"/>
+    <p:sldId id="296" r:id="rId41"/>
   </p:sldIdLst>
   <p:sldSz cx="12192000" cy="6858000"/>
   <p:notesSz cx="6858000" cy="9144000"/>
@@ -134,6 +143,11 @@
       </a:defRPr>
     </a:lvl9pPr>
   </p:defaultTextStyle>
+  <p:extLst>
+    <p:ext uri="{EFAFB233-063F-42B5-8137-9DF3F51BA10A}">
+      <p15:sldGuideLst xmlns:p15="http://schemas.microsoft.com/office/powerpoint/2012/main"/>
+    </p:ext>
+  </p:extLst>
 </p:presentation>
 </file>
 
@@ -268,7 +282,7 @@
           <a:p>
             <a:fld id="{45A12D57-E5A4-43AE-B3FF-CD00375F95E9}" type="datetimeFigureOut">
               <a:rPr lang="en-GB" smtClean="0"/>
-              <a:t>05/07/2017</a:t>
+              <a:t>06/07/2017</a:t>
             </a:fld>
             <a:endParaRPr lang="en-GB"/>
           </a:p>
@@ -438,7 +452,7 @@
           <a:p>
             <a:fld id="{45A12D57-E5A4-43AE-B3FF-CD00375F95E9}" type="datetimeFigureOut">
               <a:rPr lang="en-GB" smtClean="0"/>
-              <a:t>05/07/2017</a:t>
+              <a:t>06/07/2017</a:t>
             </a:fld>
             <a:endParaRPr lang="en-GB"/>
           </a:p>
@@ -618,7 +632,7 @@
           <a:p>
             <a:fld id="{45A12D57-E5A4-43AE-B3FF-CD00375F95E9}" type="datetimeFigureOut">
               <a:rPr lang="en-GB" smtClean="0"/>
-              <a:t>05/07/2017</a:t>
+              <a:t>06/07/2017</a:t>
             </a:fld>
             <a:endParaRPr lang="en-GB"/>
           </a:p>
@@ -788,7 +802,7 @@
           <a:p>
             <a:fld id="{45A12D57-E5A4-43AE-B3FF-CD00375F95E9}" type="datetimeFigureOut">
               <a:rPr lang="en-GB" smtClean="0"/>
-              <a:t>05/07/2017</a:t>
+              <a:t>06/07/2017</a:t>
             </a:fld>
             <a:endParaRPr lang="en-GB"/>
           </a:p>
@@ -1034,7 +1048,7 @@
           <a:p>
             <a:fld id="{45A12D57-E5A4-43AE-B3FF-CD00375F95E9}" type="datetimeFigureOut">
               <a:rPr lang="en-GB" smtClean="0"/>
-              <a:t>05/07/2017</a:t>
+              <a:t>06/07/2017</a:t>
             </a:fld>
             <a:endParaRPr lang="en-GB"/>
           </a:p>
@@ -1266,7 +1280,7 @@
           <a:p>
             <a:fld id="{45A12D57-E5A4-43AE-B3FF-CD00375F95E9}" type="datetimeFigureOut">
               <a:rPr lang="en-GB" smtClean="0"/>
-              <a:t>05/07/2017</a:t>
+              <a:t>06/07/2017</a:t>
             </a:fld>
             <a:endParaRPr lang="en-GB"/>
           </a:p>
@@ -1633,7 +1647,7 @@
           <a:p>
             <a:fld id="{45A12D57-E5A4-43AE-B3FF-CD00375F95E9}" type="datetimeFigureOut">
               <a:rPr lang="en-GB" smtClean="0"/>
-              <a:t>05/07/2017</a:t>
+              <a:t>06/07/2017</a:t>
             </a:fld>
             <a:endParaRPr lang="en-GB"/>
           </a:p>
@@ -1751,7 +1765,7 @@
           <a:p>
             <a:fld id="{45A12D57-E5A4-43AE-B3FF-CD00375F95E9}" type="datetimeFigureOut">
               <a:rPr lang="en-GB" smtClean="0"/>
-              <a:t>05/07/2017</a:t>
+              <a:t>06/07/2017</a:t>
             </a:fld>
             <a:endParaRPr lang="en-GB"/>
           </a:p>
@@ -1846,7 +1860,7 @@
           <a:p>
             <a:fld id="{45A12D57-E5A4-43AE-B3FF-CD00375F95E9}" type="datetimeFigureOut">
               <a:rPr lang="en-GB" smtClean="0"/>
-              <a:t>05/07/2017</a:t>
+              <a:t>06/07/2017</a:t>
             </a:fld>
             <a:endParaRPr lang="en-GB"/>
           </a:p>
@@ -2123,7 +2137,7 @@
           <a:p>
             <a:fld id="{45A12D57-E5A4-43AE-B3FF-CD00375F95E9}" type="datetimeFigureOut">
               <a:rPr lang="en-GB" smtClean="0"/>
-              <a:t>05/07/2017</a:t>
+              <a:t>06/07/2017</a:t>
             </a:fld>
             <a:endParaRPr lang="en-GB"/>
           </a:p>
@@ -2376,7 +2390,7 @@
           <a:p>
             <a:fld id="{45A12D57-E5A4-43AE-B3FF-CD00375F95E9}" type="datetimeFigureOut">
               <a:rPr lang="en-GB" smtClean="0"/>
-              <a:t>05/07/2017</a:t>
+              <a:t>06/07/2017</a:t>
             </a:fld>
             <a:endParaRPr lang="en-GB"/>
           </a:p>
@@ -2589,7 +2603,7 @@
           <a:p>
             <a:fld id="{45A12D57-E5A4-43AE-B3FF-CD00375F95E9}" type="datetimeFigureOut">
               <a:rPr lang="en-GB" smtClean="0"/>
-              <a:t>05/07/2017</a:t>
+              <a:t>06/07/2017</a:t>
             </a:fld>
             <a:endParaRPr lang="en-GB"/>
           </a:p>
@@ -6691,6 +6705,36 @@
           </a:p>
         </p:txBody>
       </p:sp>
+      <p:sp>
+        <p:nvSpPr>
+          <p:cNvPr id="5" name="TextBox 4"/>
+          <p:cNvSpPr txBox="1"/>
+          <p:nvPr/>
+        </p:nvSpPr>
+        <p:spPr>
+          <a:xfrm>
+            <a:off x="1135896" y="1767668"/>
+            <a:ext cx="816889" cy="369332"/>
+          </a:xfrm>
+          <a:prstGeom prst="rect">
+            <a:avLst/>
+          </a:prstGeom>
+          <a:noFill/>
+        </p:spPr>
+        <p:txBody>
+          <a:bodyPr wrap="square" rtlCol="0">
+            <a:spAutoFit/>
+          </a:bodyPr>
+          <a:lstStyle/>
+          <a:p>
+            <a:r>
+              <a:rPr lang="en-GB" dirty="0" smtClean="0"/>
+              <a:t>Path</a:t>
+            </a:r>
+            <a:endParaRPr lang="en-GB" dirty="0"/>
+          </a:p>
+        </p:txBody>
+      </p:sp>
     </p:spTree>
     <p:extLst>
       <p:ext uri="{BB962C8B-B14F-4D97-AF65-F5344CB8AC3E}">
@@ -7707,6 +7751,36 @@
           </a:p>
         </p:txBody>
       </p:sp>
+      <p:sp>
+        <p:nvSpPr>
+          <p:cNvPr id="6" name="TextBox 5"/>
+          <p:cNvSpPr txBox="1"/>
+          <p:nvPr/>
+        </p:nvSpPr>
+        <p:spPr>
+          <a:xfrm>
+            <a:off x="1135896" y="1767668"/>
+            <a:ext cx="1212097" cy="369332"/>
+          </a:xfrm>
+          <a:prstGeom prst="rect">
+            <a:avLst/>
+          </a:prstGeom>
+          <a:noFill/>
+        </p:spPr>
+        <p:txBody>
+          <a:bodyPr wrap="square" rtlCol="0">
+            <a:spAutoFit/>
+          </a:bodyPr>
+          <a:lstStyle/>
+          <a:p>
+            <a:r>
+              <a:rPr lang="en-GB" dirty="0" smtClean="0"/>
+              <a:t>Cycle Way</a:t>
+            </a:r>
+            <a:endParaRPr lang="en-GB" dirty="0"/>
+          </a:p>
+        </p:txBody>
+      </p:sp>
     </p:spTree>
     <p:extLst>
       <p:ext uri="{BB962C8B-B14F-4D97-AF65-F5344CB8AC3E}">
@@ -11238,6 +11312,1792 @@
 </p:sld>
 </file>
 
+<file path=ppt/slides/slide32.xml><?xml version="1.0" encoding="utf-8"?>
+<p:sld xmlns:a="http://schemas.openxmlformats.org/drawingml/2006/main" xmlns:r="http://schemas.openxmlformats.org/officeDocument/2006/relationships" xmlns:p="http://schemas.openxmlformats.org/presentationml/2006/main">
+  <p:cSld>
+    <p:spTree>
+      <p:nvGrpSpPr>
+        <p:cNvPr id="1" name=""/>
+        <p:cNvGrpSpPr/>
+        <p:nvPr/>
+      </p:nvGrpSpPr>
+      <p:grpSpPr>
+        <a:xfrm>
+          <a:off x="0" y="0"/>
+          <a:ext cx="0" cy="0"/>
+          <a:chOff x="0" y="0"/>
+          <a:chExt cx="0" cy="0"/>
+        </a:xfrm>
+      </p:grpSpPr>
+      <p:sp>
+        <p:nvSpPr>
+          <p:cNvPr id="4" name="TextBox 3"/>
+          <p:cNvSpPr txBox="1"/>
+          <p:nvPr/>
+        </p:nvSpPr>
+        <p:spPr>
+          <a:xfrm>
+            <a:off x="495300" y="406400"/>
+            <a:ext cx="558800" cy="369332"/>
+          </a:xfrm>
+          <a:prstGeom prst="rect">
+            <a:avLst/>
+          </a:prstGeom>
+          <a:noFill/>
+        </p:spPr>
+        <p:txBody>
+          <a:bodyPr wrap="square" rtlCol="0">
+            <a:spAutoFit/>
+          </a:bodyPr>
+          <a:lstStyle/>
+          <a:p>
+            <a:r>
+              <a:rPr lang="en-GB" dirty="0" smtClean="0"/>
+              <a:t>32</a:t>
+            </a:r>
+            <a:endParaRPr lang="en-GB" dirty="0"/>
+          </a:p>
+        </p:txBody>
+      </p:sp>
+      <p:sp>
+        <p:nvSpPr>
+          <p:cNvPr id="5" name="TextBox 4"/>
+          <p:cNvSpPr txBox="1"/>
+          <p:nvPr/>
+        </p:nvSpPr>
+        <p:spPr>
+          <a:xfrm>
+            <a:off x="3124200" y="1968500"/>
+            <a:ext cx="6083300" cy="1569660"/>
+          </a:xfrm>
+          <a:prstGeom prst="rect">
+            <a:avLst/>
+          </a:prstGeom>
+          <a:noFill/>
+        </p:spPr>
+        <p:txBody>
+          <a:bodyPr wrap="square" rtlCol="0">
+            <a:spAutoFit/>
+          </a:bodyPr>
+          <a:lstStyle/>
+          <a:p>
+            <a:pPr algn="ctr"/>
+            <a:r>
+              <a:rPr lang="en-GB" sz="9600" dirty="0" smtClean="0">
+                <a:solidFill>
+                  <a:srgbClr val="FF0000"/>
+                </a:solidFill>
+              </a:rPr>
+              <a:t>Errors</a:t>
+            </a:r>
+            <a:endParaRPr lang="en-GB" sz="9600" dirty="0">
+              <a:solidFill>
+                <a:srgbClr val="FF0000"/>
+              </a:solidFill>
+            </a:endParaRPr>
+          </a:p>
+        </p:txBody>
+      </p:sp>
+    </p:spTree>
+    <p:extLst>
+      <p:ext uri="{BB962C8B-B14F-4D97-AF65-F5344CB8AC3E}">
+        <p14:creationId xmlns:p14="http://schemas.microsoft.com/office/powerpoint/2010/main" val="1278032941"/>
+      </p:ext>
+    </p:extLst>
+  </p:cSld>
+  <p:clrMapOvr>
+    <a:masterClrMapping/>
+  </p:clrMapOvr>
+</p:sld>
+</file>
+
+<file path=ppt/slides/slide33.xml><?xml version="1.0" encoding="utf-8"?>
+<p:sld xmlns:a="http://schemas.openxmlformats.org/drawingml/2006/main" xmlns:r="http://schemas.openxmlformats.org/officeDocument/2006/relationships" xmlns:p="http://schemas.openxmlformats.org/presentationml/2006/main">
+  <p:cSld>
+    <p:spTree>
+      <p:nvGrpSpPr>
+        <p:cNvPr id="1" name=""/>
+        <p:cNvGrpSpPr/>
+        <p:nvPr/>
+      </p:nvGrpSpPr>
+      <p:grpSpPr>
+        <a:xfrm>
+          <a:off x="0" y="0"/>
+          <a:ext cx="0" cy="0"/>
+          <a:chOff x="0" y="0"/>
+          <a:chExt cx="0" cy="0"/>
+        </a:xfrm>
+      </p:grpSpPr>
+      <p:sp>
+        <p:nvSpPr>
+          <p:cNvPr id="4" name="TextBox 3"/>
+          <p:cNvSpPr txBox="1"/>
+          <p:nvPr/>
+        </p:nvSpPr>
+        <p:spPr>
+          <a:xfrm>
+            <a:off x="495300" y="406400"/>
+            <a:ext cx="558800" cy="369332"/>
+          </a:xfrm>
+          <a:prstGeom prst="rect">
+            <a:avLst/>
+          </a:prstGeom>
+          <a:noFill/>
+        </p:spPr>
+        <p:txBody>
+          <a:bodyPr wrap="square" rtlCol="0">
+            <a:spAutoFit/>
+          </a:bodyPr>
+          <a:lstStyle/>
+          <a:p>
+            <a:r>
+              <a:rPr lang="en-GB" dirty="0" smtClean="0"/>
+              <a:t>33</a:t>
+            </a:r>
+            <a:endParaRPr lang="en-GB" dirty="0"/>
+          </a:p>
+        </p:txBody>
+      </p:sp>
+      <p:sp>
+        <p:nvSpPr>
+          <p:cNvPr id="5" name="TextBox 4"/>
+          <p:cNvSpPr txBox="1"/>
+          <p:nvPr/>
+        </p:nvSpPr>
+        <p:spPr>
+          <a:xfrm>
+            <a:off x="3124200" y="1968500"/>
+            <a:ext cx="6083300" cy="1569660"/>
+          </a:xfrm>
+          <a:prstGeom prst="rect">
+            <a:avLst/>
+          </a:prstGeom>
+          <a:noFill/>
+        </p:spPr>
+        <p:txBody>
+          <a:bodyPr wrap="square" rtlCol="0">
+            <a:spAutoFit/>
+          </a:bodyPr>
+          <a:lstStyle/>
+          <a:p>
+            <a:pPr algn="ctr"/>
+            <a:r>
+              <a:rPr lang="en-GB" sz="9600" dirty="0" smtClean="0">
+                <a:solidFill>
+                  <a:srgbClr val="FF0000"/>
+                </a:solidFill>
+              </a:rPr>
+              <a:t>Errors</a:t>
+            </a:r>
+            <a:endParaRPr lang="en-GB" sz="9600" dirty="0">
+              <a:solidFill>
+                <a:srgbClr val="FF0000"/>
+              </a:solidFill>
+            </a:endParaRPr>
+          </a:p>
+        </p:txBody>
+      </p:sp>
+    </p:spTree>
+    <p:extLst>
+      <p:ext uri="{BB962C8B-B14F-4D97-AF65-F5344CB8AC3E}">
+        <p14:creationId xmlns:p14="http://schemas.microsoft.com/office/powerpoint/2010/main" val="2822513761"/>
+      </p:ext>
+    </p:extLst>
+  </p:cSld>
+  <p:clrMapOvr>
+    <a:masterClrMapping/>
+  </p:clrMapOvr>
+</p:sld>
+</file>
+
+<file path=ppt/slides/slide34.xml><?xml version="1.0" encoding="utf-8"?>
+<p:sld xmlns:a="http://schemas.openxmlformats.org/drawingml/2006/main" xmlns:r="http://schemas.openxmlformats.org/officeDocument/2006/relationships" xmlns:p="http://schemas.openxmlformats.org/presentationml/2006/main">
+  <p:cSld>
+    <p:spTree>
+      <p:nvGrpSpPr>
+        <p:cNvPr id="1" name=""/>
+        <p:cNvGrpSpPr/>
+        <p:nvPr/>
+      </p:nvGrpSpPr>
+      <p:grpSpPr>
+        <a:xfrm>
+          <a:off x="0" y="0"/>
+          <a:ext cx="0" cy="0"/>
+          <a:chOff x="0" y="0"/>
+          <a:chExt cx="0" cy="0"/>
+        </a:xfrm>
+      </p:grpSpPr>
+      <p:sp>
+        <p:nvSpPr>
+          <p:cNvPr id="4" name="TextBox 3"/>
+          <p:cNvSpPr txBox="1"/>
+          <p:nvPr/>
+        </p:nvSpPr>
+        <p:spPr>
+          <a:xfrm>
+            <a:off x="495300" y="406400"/>
+            <a:ext cx="558800" cy="369332"/>
+          </a:xfrm>
+          <a:prstGeom prst="rect">
+            <a:avLst/>
+          </a:prstGeom>
+          <a:noFill/>
+        </p:spPr>
+        <p:txBody>
+          <a:bodyPr wrap="square" rtlCol="0">
+            <a:spAutoFit/>
+          </a:bodyPr>
+          <a:lstStyle/>
+          <a:p>
+            <a:r>
+              <a:rPr lang="en-GB" dirty="0" smtClean="0"/>
+              <a:t>34</a:t>
+            </a:r>
+            <a:endParaRPr lang="en-GB" dirty="0"/>
+          </a:p>
+        </p:txBody>
+      </p:sp>
+      <p:sp>
+        <p:nvSpPr>
+          <p:cNvPr id="5" name="TextBox 4"/>
+          <p:cNvSpPr txBox="1"/>
+          <p:nvPr/>
+        </p:nvSpPr>
+        <p:spPr>
+          <a:xfrm>
+            <a:off x="3124200" y="1968500"/>
+            <a:ext cx="6083300" cy="1569660"/>
+          </a:xfrm>
+          <a:prstGeom prst="rect">
+            <a:avLst/>
+          </a:prstGeom>
+          <a:noFill/>
+        </p:spPr>
+        <p:txBody>
+          <a:bodyPr wrap="square" rtlCol="0">
+            <a:spAutoFit/>
+          </a:bodyPr>
+          <a:lstStyle/>
+          <a:p>
+            <a:pPr algn="ctr"/>
+            <a:r>
+              <a:rPr lang="en-GB" sz="9600" dirty="0" smtClean="0">
+                <a:solidFill>
+                  <a:srgbClr val="FF0000"/>
+                </a:solidFill>
+              </a:rPr>
+              <a:t>Errors</a:t>
+            </a:r>
+            <a:endParaRPr lang="en-GB" sz="9600" dirty="0">
+              <a:solidFill>
+                <a:srgbClr val="FF0000"/>
+              </a:solidFill>
+            </a:endParaRPr>
+          </a:p>
+        </p:txBody>
+      </p:sp>
+    </p:spTree>
+    <p:extLst>
+      <p:ext uri="{BB962C8B-B14F-4D97-AF65-F5344CB8AC3E}">
+        <p14:creationId xmlns:p14="http://schemas.microsoft.com/office/powerpoint/2010/main" val="257640572"/>
+      </p:ext>
+    </p:extLst>
+  </p:cSld>
+  <p:clrMapOvr>
+    <a:masterClrMapping/>
+  </p:clrMapOvr>
+</p:sld>
+</file>
+
+<file path=ppt/slides/slide35.xml><?xml version="1.0" encoding="utf-8"?>
+<p:sld xmlns:a="http://schemas.openxmlformats.org/drawingml/2006/main" xmlns:r="http://schemas.openxmlformats.org/officeDocument/2006/relationships" xmlns:p="http://schemas.openxmlformats.org/presentationml/2006/main">
+  <p:cSld>
+    <p:spTree>
+      <p:nvGrpSpPr>
+        <p:cNvPr id="1" name=""/>
+        <p:cNvGrpSpPr/>
+        <p:nvPr/>
+      </p:nvGrpSpPr>
+      <p:grpSpPr>
+        <a:xfrm>
+          <a:off x="0" y="0"/>
+          <a:ext cx="0" cy="0"/>
+          <a:chOff x="0" y="0"/>
+          <a:chExt cx="0" cy="0"/>
+        </a:xfrm>
+      </p:grpSpPr>
+      <p:sp>
+        <p:nvSpPr>
+          <p:cNvPr id="4" name="TextBox 3"/>
+          <p:cNvSpPr txBox="1"/>
+          <p:nvPr/>
+        </p:nvSpPr>
+        <p:spPr>
+          <a:xfrm>
+            <a:off x="495300" y="406400"/>
+            <a:ext cx="558800" cy="369332"/>
+          </a:xfrm>
+          <a:prstGeom prst="rect">
+            <a:avLst/>
+          </a:prstGeom>
+          <a:noFill/>
+        </p:spPr>
+        <p:txBody>
+          <a:bodyPr wrap="square" rtlCol="0">
+            <a:spAutoFit/>
+          </a:bodyPr>
+          <a:lstStyle/>
+          <a:p>
+            <a:r>
+              <a:rPr lang="en-GB" dirty="0" smtClean="0"/>
+              <a:t>35</a:t>
+            </a:r>
+            <a:endParaRPr lang="en-GB" dirty="0"/>
+          </a:p>
+        </p:txBody>
+      </p:sp>
+      <p:sp>
+        <p:nvSpPr>
+          <p:cNvPr id="5" name="Rectangle 4"/>
+          <p:cNvSpPr/>
+          <p:nvPr/>
+        </p:nvSpPr>
+        <p:spPr>
+          <a:xfrm>
+            <a:off x="4984750" y="3568700"/>
+            <a:ext cx="1524000" cy="152400"/>
+          </a:xfrm>
+          <a:prstGeom prst="rect">
+            <a:avLst/>
+          </a:prstGeom>
+          <a:ln>
+            <a:solidFill>
+              <a:schemeClr val="tx1"/>
+            </a:solidFill>
+          </a:ln>
+        </p:spPr>
+        <p:style>
+          <a:lnRef idx="2">
+            <a:schemeClr val="accent3">
+              <a:shade val="50000"/>
+            </a:schemeClr>
+          </a:lnRef>
+          <a:fillRef idx="1">
+            <a:schemeClr val="accent3"/>
+          </a:fillRef>
+          <a:effectRef idx="0">
+            <a:schemeClr val="accent3"/>
+          </a:effectRef>
+          <a:fontRef idx="minor">
+            <a:schemeClr val="lt1"/>
+          </a:fontRef>
+        </p:style>
+        <p:txBody>
+          <a:bodyPr rtlCol="0" anchor="ctr"/>
+          <a:lstStyle/>
+          <a:p>
+            <a:pPr algn="ctr"/>
+            <a:endParaRPr lang="en-GB"/>
+          </a:p>
+        </p:txBody>
+      </p:sp>
+      <p:sp>
+        <p:nvSpPr>
+          <p:cNvPr id="9" name="Down Arrow 8"/>
+          <p:cNvSpPr/>
+          <p:nvPr/>
+        </p:nvSpPr>
+        <p:spPr>
+          <a:xfrm rot="10800000">
+            <a:off x="5422900" y="1866900"/>
+            <a:ext cx="647700" cy="711200"/>
+          </a:xfrm>
+          <a:prstGeom prst="downArrow">
+            <a:avLst/>
+          </a:prstGeom>
+        </p:spPr>
+        <p:style>
+          <a:lnRef idx="2">
+            <a:schemeClr val="accent1">
+              <a:shade val="50000"/>
+            </a:schemeClr>
+          </a:lnRef>
+          <a:fillRef idx="1">
+            <a:schemeClr val="accent1"/>
+          </a:fillRef>
+          <a:effectRef idx="0">
+            <a:schemeClr val="accent1"/>
+          </a:effectRef>
+          <a:fontRef idx="minor">
+            <a:schemeClr val="lt1"/>
+          </a:fontRef>
+        </p:style>
+        <p:txBody>
+          <a:bodyPr rtlCol="0" anchor="ctr"/>
+          <a:lstStyle/>
+          <a:p>
+            <a:pPr algn="ctr"/>
+            <a:endParaRPr lang="en-GB"/>
+          </a:p>
+        </p:txBody>
+      </p:sp>
+      <p:sp>
+        <p:nvSpPr>
+          <p:cNvPr id="7" name="Rectangle 6"/>
+          <p:cNvSpPr/>
+          <p:nvPr/>
+        </p:nvSpPr>
+        <p:spPr>
+          <a:xfrm>
+            <a:off x="6508750" y="3429000"/>
+            <a:ext cx="1041400" cy="292100"/>
+          </a:xfrm>
+          <a:prstGeom prst="rect">
+            <a:avLst/>
+          </a:prstGeom>
+          <a:solidFill>
+            <a:schemeClr val="bg2">
+              <a:lumMod val="50000"/>
+            </a:schemeClr>
+          </a:solidFill>
+          <a:ln>
+            <a:solidFill>
+              <a:schemeClr val="tx1"/>
+            </a:solidFill>
+          </a:ln>
+        </p:spPr>
+        <p:style>
+          <a:lnRef idx="2">
+            <a:schemeClr val="accent3">
+              <a:shade val="50000"/>
+            </a:schemeClr>
+          </a:lnRef>
+          <a:fillRef idx="1">
+            <a:schemeClr val="accent3"/>
+          </a:fillRef>
+          <a:effectRef idx="0">
+            <a:schemeClr val="accent3"/>
+          </a:effectRef>
+          <a:fontRef idx="minor">
+            <a:schemeClr val="lt1"/>
+          </a:fontRef>
+        </p:style>
+        <p:txBody>
+          <a:bodyPr rtlCol="0" anchor="ctr"/>
+          <a:lstStyle/>
+          <a:p>
+            <a:pPr algn="ctr"/>
+            <a:endParaRPr lang="en-GB"/>
+          </a:p>
+        </p:txBody>
+      </p:sp>
+    </p:spTree>
+    <p:extLst>
+      <p:ext uri="{BB962C8B-B14F-4D97-AF65-F5344CB8AC3E}">
+        <p14:creationId xmlns:p14="http://schemas.microsoft.com/office/powerpoint/2010/main" val="745750795"/>
+      </p:ext>
+    </p:extLst>
+  </p:cSld>
+  <p:clrMapOvr>
+    <a:masterClrMapping/>
+  </p:clrMapOvr>
+</p:sld>
+</file>
+
+<file path=ppt/slides/slide36.xml><?xml version="1.0" encoding="utf-8"?>
+<p:sld xmlns:a="http://schemas.openxmlformats.org/drawingml/2006/main" xmlns:r="http://schemas.openxmlformats.org/officeDocument/2006/relationships" xmlns:p="http://schemas.openxmlformats.org/presentationml/2006/main">
+  <p:cSld>
+    <p:spTree>
+      <p:nvGrpSpPr>
+        <p:cNvPr id="1" name=""/>
+        <p:cNvGrpSpPr/>
+        <p:nvPr/>
+      </p:nvGrpSpPr>
+      <p:grpSpPr>
+        <a:xfrm>
+          <a:off x="0" y="0"/>
+          <a:ext cx="0" cy="0"/>
+          <a:chOff x="0" y="0"/>
+          <a:chExt cx="0" cy="0"/>
+        </a:xfrm>
+      </p:grpSpPr>
+      <p:sp>
+        <p:nvSpPr>
+          <p:cNvPr id="4" name="TextBox 3"/>
+          <p:cNvSpPr txBox="1"/>
+          <p:nvPr/>
+        </p:nvSpPr>
+        <p:spPr>
+          <a:xfrm>
+            <a:off x="495300" y="406400"/>
+            <a:ext cx="558800" cy="369332"/>
+          </a:xfrm>
+          <a:prstGeom prst="rect">
+            <a:avLst/>
+          </a:prstGeom>
+          <a:noFill/>
+        </p:spPr>
+        <p:txBody>
+          <a:bodyPr wrap="square" rtlCol="0">
+            <a:spAutoFit/>
+          </a:bodyPr>
+          <a:lstStyle/>
+          <a:p>
+            <a:r>
+              <a:rPr lang="en-GB" dirty="0" smtClean="0"/>
+              <a:t>36</a:t>
+            </a:r>
+            <a:endParaRPr lang="en-GB" dirty="0"/>
+          </a:p>
+        </p:txBody>
+      </p:sp>
+      <p:sp>
+        <p:nvSpPr>
+          <p:cNvPr id="5" name="TextBox 4"/>
+          <p:cNvSpPr txBox="1"/>
+          <p:nvPr/>
+        </p:nvSpPr>
+        <p:spPr>
+          <a:xfrm>
+            <a:off x="3124200" y="1968500"/>
+            <a:ext cx="6083300" cy="1569660"/>
+          </a:xfrm>
+          <a:prstGeom prst="rect">
+            <a:avLst/>
+          </a:prstGeom>
+          <a:noFill/>
+        </p:spPr>
+        <p:txBody>
+          <a:bodyPr wrap="square" rtlCol="0">
+            <a:spAutoFit/>
+          </a:bodyPr>
+          <a:lstStyle/>
+          <a:p>
+            <a:pPr algn="ctr"/>
+            <a:r>
+              <a:rPr lang="en-GB" sz="9600" dirty="0" smtClean="0">
+                <a:solidFill>
+                  <a:srgbClr val="FF0000"/>
+                </a:solidFill>
+              </a:rPr>
+              <a:t>Errors</a:t>
+            </a:r>
+            <a:endParaRPr lang="en-GB" sz="9600" dirty="0">
+              <a:solidFill>
+                <a:srgbClr val="FF0000"/>
+              </a:solidFill>
+            </a:endParaRPr>
+          </a:p>
+        </p:txBody>
+      </p:sp>
+    </p:spTree>
+    <p:extLst>
+      <p:ext uri="{BB962C8B-B14F-4D97-AF65-F5344CB8AC3E}">
+        <p14:creationId xmlns:p14="http://schemas.microsoft.com/office/powerpoint/2010/main" val="1096263601"/>
+      </p:ext>
+    </p:extLst>
+  </p:cSld>
+  <p:clrMapOvr>
+    <a:masterClrMapping/>
+  </p:clrMapOvr>
+</p:sld>
+</file>
+
+<file path=ppt/slides/slide37.xml><?xml version="1.0" encoding="utf-8"?>
+<p:sld xmlns:a="http://schemas.openxmlformats.org/drawingml/2006/main" xmlns:r="http://schemas.openxmlformats.org/officeDocument/2006/relationships" xmlns:p="http://schemas.openxmlformats.org/presentationml/2006/main">
+  <p:cSld>
+    <p:spTree>
+      <p:nvGrpSpPr>
+        <p:cNvPr id="1" name=""/>
+        <p:cNvGrpSpPr/>
+        <p:nvPr/>
+      </p:nvGrpSpPr>
+      <p:grpSpPr>
+        <a:xfrm>
+          <a:off x="0" y="0"/>
+          <a:ext cx="0" cy="0"/>
+          <a:chOff x="0" y="0"/>
+          <a:chExt cx="0" cy="0"/>
+        </a:xfrm>
+      </p:grpSpPr>
+      <p:sp>
+        <p:nvSpPr>
+          <p:cNvPr id="4" name="TextBox 3"/>
+          <p:cNvSpPr txBox="1"/>
+          <p:nvPr/>
+        </p:nvSpPr>
+        <p:spPr>
+          <a:xfrm>
+            <a:off x="495300" y="406400"/>
+            <a:ext cx="558800" cy="369332"/>
+          </a:xfrm>
+          <a:prstGeom prst="rect">
+            <a:avLst/>
+          </a:prstGeom>
+          <a:noFill/>
+        </p:spPr>
+        <p:txBody>
+          <a:bodyPr wrap="square" rtlCol="0">
+            <a:spAutoFit/>
+          </a:bodyPr>
+          <a:lstStyle/>
+          <a:p>
+            <a:r>
+              <a:rPr lang="en-GB" dirty="0" smtClean="0"/>
+              <a:t>37</a:t>
+            </a:r>
+            <a:endParaRPr lang="en-GB" dirty="0"/>
+          </a:p>
+        </p:txBody>
+      </p:sp>
+      <p:sp>
+        <p:nvSpPr>
+          <p:cNvPr id="5" name="Rectangle 4"/>
+          <p:cNvSpPr/>
+          <p:nvPr/>
+        </p:nvSpPr>
+        <p:spPr>
+          <a:xfrm>
+            <a:off x="3810000" y="3810000"/>
+            <a:ext cx="1524000" cy="152400"/>
+          </a:xfrm>
+          <a:prstGeom prst="rect">
+            <a:avLst/>
+          </a:prstGeom>
+          <a:ln>
+            <a:solidFill>
+              <a:schemeClr val="tx1"/>
+            </a:solidFill>
+          </a:ln>
+        </p:spPr>
+        <p:style>
+          <a:lnRef idx="2">
+            <a:schemeClr val="accent3">
+              <a:shade val="50000"/>
+            </a:schemeClr>
+          </a:lnRef>
+          <a:fillRef idx="1">
+            <a:schemeClr val="accent3"/>
+          </a:fillRef>
+          <a:effectRef idx="0">
+            <a:schemeClr val="accent3"/>
+          </a:effectRef>
+          <a:fontRef idx="minor">
+            <a:schemeClr val="lt1"/>
+          </a:fontRef>
+        </p:style>
+        <p:txBody>
+          <a:bodyPr rtlCol="0" anchor="ctr"/>
+          <a:lstStyle/>
+          <a:p>
+            <a:pPr algn="ctr"/>
+            <a:endParaRPr lang="en-GB"/>
+          </a:p>
+        </p:txBody>
+      </p:sp>
+      <p:sp>
+        <p:nvSpPr>
+          <p:cNvPr id="6" name="Rectangle 5"/>
+          <p:cNvSpPr/>
+          <p:nvPr/>
+        </p:nvSpPr>
+        <p:spPr>
+          <a:xfrm>
+            <a:off x="5334000" y="3810000"/>
+            <a:ext cx="1524000" cy="152400"/>
+          </a:xfrm>
+          <a:prstGeom prst="rect">
+            <a:avLst/>
+          </a:prstGeom>
+          <a:ln>
+            <a:solidFill>
+              <a:schemeClr val="tx1"/>
+            </a:solidFill>
+          </a:ln>
+        </p:spPr>
+        <p:style>
+          <a:lnRef idx="2">
+            <a:schemeClr val="accent3">
+              <a:shade val="50000"/>
+            </a:schemeClr>
+          </a:lnRef>
+          <a:fillRef idx="1">
+            <a:schemeClr val="accent3"/>
+          </a:fillRef>
+          <a:effectRef idx="0">
+            <a:schemeClr val="accent3"/>
+          </a:effectRef>
+          <a:fontRef idx="minor">
+            <a:schemeClr val="lt1"/>
+          </a:fontRef>
+        </p:style>
+        <p:txBody>
+          <a:bodyPr rtlCol="0" anchor="ctr"/>
+          <a:lstStyle/>
+          <a:p>
+            <a:pPr algn="ctr"/>
+            <a:endParaRPr lang="en-GB"/>
+          </a:p>
+        </p:txBody>
+      </p:sp>
+      <p:sp>
+        <p:nvSpPr>
+          <p:cNvPr id="7" name="Rectangle 6"/>
+          <p:cNvSpPr/>
+          <p:nvPr/>
+        </p:nvSpPr>
+        <p:spPr>
+          <a:xfrm>
+            <a:off x="2768600" y="3670300"/>
+            <a:ext cx="1041400" cy="292100"/>
+          </a:xfrm>
+          <a:prstGeom prst="rect">
+            <a:avLst/>
+          </a:prstGeom>
+          <a:solidFill>
+            <a:schemeClr val="bg2">
+              <a:lumMod val="50000"/>
+            </a:schemeClr>
+          </a:solidFill>
+          <a:ln>
+            <a:solidFill>
+              <a:schemeClr val="tx1"/>
+            </a:solidFill>
+          </a:ln>
+        </p:spPr>
+        <p:style>
+          <a:lnRef idx="2">
+            <a:schemeClr val="accent3">
+              <a:shade val="50000"/>
+            </a:schemeClr>
+          </a:lnRef>
+          <a:fillRef idx="1">
+            <a:schemeClr val="accent3"/>
+          </a:fillRef>
+          <a:effectRef idx="0">
+            <a:schemeClr val="accent3"/>
+          </a:effectRef>
+          <a:fontRef idx="minor">
+            <a:schemeClr val="lt1"/>
+          </a:fontRef>
+        </p:style>
+        <p:txBody>
+          <a:bodyPr rtlCol="0" anchor="ctr"/>
+          <a:lstStyle/>
+          <a:p>
+            <a:pPr algn="ctr"/>
+            <a:endParaRPr lang="en-GB"/>
+          </a:p>
+        </p:txBody>
+      </p:sp>
+      <p:sp>
+        <p:nvSpPr>
+          <p:cNvPr id="8" name="Rectangle 7"/>
+          <p:cNvSpPr/>
+          <p:nvPr/>
+        </p:nvSpPr>
+        <p:spPr>
+          <a:xfrm>
+            <a:off x="8382000" y="3670300"/>
+            <a:ext cx="1041400" cy="292100"/>
+          </a:xfrm>
+          <a:prstGeom prst="rect">
+            <a:avLst/>
+          </a:prstGeom>
+          <a:solidFill>
+            <a:schemeClr val="bg2">
+              <a:lumMod val="50000"/>
+            </a:schemeClr>
+          </a:solidFill>
+          <a:ln>
+            <a:solidFill>
+              <a:schemeClr val="tx1"/>
+            </a:solidFill>
+          </a:ln>
+        </p:spPr>
+        <p:style>
+          <a:lnRef idx="2">
+            <a:schemeClr val="accent3">
+              <a:shade val="50000"/>
+            </a:schemeClr>
+          </a:lnRef>
+          <a:fillRef idx="1">
+            <a:schemeClr val="accent3"/>
+          </a:fillRef>
+          <a:effectRef idx="0">
+            <a:schemeClr val="accent3"/>
+          </a:effectRef>
+          <a:fontRef idx="minor">
+            <a:schemeClr val="lt1"/>
+          </a:fontRef>
+        </p:style>
+        <p:txBody>
+          <a:bodyPr rtlCol="0" anchor="ctr"/>
+          <a:lstStyle/>
+          <a:p>
+            <a:pPr algn="ctr"/>
+            <a:endParaRPr lang="en-GB"/>
+          </a:p>
+        </p:txBody>
+      </p:sp>
+      <p:sp>
+        <p:nvSpPr>
+          <p:cNvPr id="9" name="Down Arrow 8"/>
+          <p:cNvSpPr/>
+          <p:nvPr/>
+        </p:nvSpPr>
+        <p:spPr>
+          <a:xfrm rot="10800000">
+            <a:off x="5772150" y="2673350"/>
+            <a:ext cx="647700" cy="711200"/>
+          </a:xfrm>
+          <a:prstGeom prst="downArrow">
+            <a:avLst/>
+          </a:prstGeom>
+        </p:spPr>
+        <p:style>
+          <a:lnRef idx="2">
+            <a:schemeClr val="accent1">
+              <a:shade val="50000"/>
+            </a:schemeClr>
+          </a:lnRef>
+          <a:fillRef idx="1">
+            <a:schemeClr val="accent1"/>
+          </a:fillRef>
+          <a:effectRef idx="0">
+            <a:schemeClr val="accent1"/>
+          </a:effectRef>
+          <a:fontRef idx="minor">
+            <a:schemeClr val="lt1"/>
+          </a:fontRef>
+        </p:style>
+        <p:txBody>
+          <a:bodyPr rtlCol="0" anchor="ctr"/>
+          <a:lstStyle/>
+          <a:p>
+            <a:pPr algn="ctr"/>
+            <a:endParaRPr lang="en-GB"/>
+          </a:p>
+        </p:txBody>
+      </p:sp>
+      <p:sp>
+        <p:nvSpPr>
+          <p:cNvPr id="10" name="Down Arrow 9"/>
+          <p:cNvSpPr/>
+          <p:nvPr/>
+        </p:nvSpPr>
+        <p:spPr>
+          <a:xfrm>
+            <a:off x="7296150" y="2673349"/>
+            <a:ext cx="647700" cy="711200"/>
+          </a:xfrm>
+          <a:prstGeom prst="downArrow">
+            <a:avLst/>
+          </a:prstGeom>
+        </p:spPr>
+        <p:style>
+          <a:lnRef idx="2">
+            <a:schemeClr val="accent1">
+              <a:shade val="50000"/>
+            </a:schemeClr>
+          </a:lnRef>
+          <a:fillRef idx="1">
+            <a:schemeClr val="accent1"/>
+          </a:fillRef>
+          <a:effectRef idx="0">
+            <a:schemeClr val="accent1"/>
+          </a:effectRef>
+          <a:fontRef idx="minor">
+            <a:schemeClr val="lt1"/>
+          </a:fontRef>
+        </p:style>
+        <p:txBody>
+          <a:bodyPr rtlCol="0" anchor="ctr"/>
+          <a:lstStyle/>
+          <a:p>
+            <a:pPr algn="ctr"/>
+            <a:endParaRPr lang="en-GB"/>
+          </a:p>
+        </p:txBody>
+      </p:sp>
+      <p:sp>
+        <p:nvSpPr>
+          <p:cNvPr id="11" name="Rectangle 10"/>
+          <p:cNvSpPr/>
+          <p:nvPr/>
+        </p:nvSpPr>
+        <p:spPr>
+          <a:xfrm>
+            <a:off x="6858000" y="3810000"/>
+            <a:ext cx="1524000" cy="152400"/>
+          </a:xfrm>
+          <a:prstGeom prst="rect">
+            <a:avLst/>
+          </a:prstGeom>
+          <a:ln>
+            <a:solidFill>
+              <a:schemeClr val="tx1"/>
+            </a:solidFill>
+          </a:ln>
+        </p:spPr>
+        <p:style>
+          <a:lnRef idx="2">
+            <a:schemeClr val="accent3">
+              <a:shade val="50000"/>
+            </a:schemeClr>
+          </a:lnRef>
+          <a:fillRef idx="1">
+            <a:schemeClr val="accent3"/>
+          </a:fillRef>
+          <a:effectRef idx="0">
+            <a:schemeClr val="accent3"/>
+          </a:effectRef>
+          <a:fontRef idx="minor">
+            <a:schemeClr val="lt1"/>
+          </a:fontRef>
+        </p:style>
+        <p:txBody>
+          <a:bodyPr rtlCol="0" anchor="ctr"/>
+          <a:lstStyle/>
+          <a:p>
+            <a:pPr algn="ctr"/>
+            <a:endParaRPr lang="en-GB"/>
+          </a:p>
+        </p:txBody>
+      </p:sp>
+      <p:sp>
+        <p:nvSpPr>
+          <p:cNvPr id="12" name="Down Arrow 11"/>
+          <p:cNvSpPr/>
+          <p:nvPr/>
+        </p:nvSpPr>
+        <p:spPr>
+          <a:xfrm rot="10800000">
+            <a:off x="4248150" y="2673349"/>
+            <a:ext cx="647700" cy="711200"/>
+          </a:xfrm>
+          <a:prstGeom prst="downArrow">
+            <a:avLst/>
+          </a:prstGeom>
+        </p:spPr>
+        <p:style>
+          <a:lnRef idx="2">
+            <a:schemeClr val="accent1">
+              <a:shade val="50000"/>
+            </a:schemeClr>
+          </a:lnRef>
+          <a:fillRef idx="1">
+            <a:schemeClr val="accent1"/>
+          </a:fillRef>
+          <a:effectRef idx="0">
+            <a:schemeClr val="accent1"/>
+          </a:effectRef>
+          <a:fontRef idx="minor">
+            <a:schemeClr val="lt1"/>
+          </a:fontRef>
+        </p:style>
+        <p:txBody>
+          <a:bodyPr rtlCol="0" anchor="ctr"/>
+          <a:lstStyle/>
+          <a:p>
+            <a:pPr algn="ctr"/>
+            <a:endParaRPr lang="en-GB"/>
+          </a:p>
+        </p:txBody>
+      </p:sp>
+    </p:spTree>
+    <p:extLst>
+      <p:ext uri="{BB962C8B-B14F-4D97-AF65-F5344CB8AC3E}">
+        <p14:creationId xmlns:p14="http://schemas.microsoft.com/office/powerpoint/2010/main" val="2205939252"/>
+      </p:ext>
+    </p:extLst>
+  </p:cSld>
+  <p:clrMapOvr>
+    <a:masterClrMapping/>
+  </p:clrMapOvr>
+</p:sld>
+</file>
+
+<file path=ppt/slides/slide38.xml><?xml version="1.0" encoding="utf-8"?>
+<p:sld xmlns:a="http://schemas.openxmlformats.org/drawingml/2006/main" xmlns:r="http://schemas.openxmlformats.org/officeDocument/2006/relationships" xmlns:p="http://schemas.openxmlformats.org/presentationml/2006/main">
+  <p:cSld>
+    <p:spTree>
+      <p:nvGrpSpPr>
+        <p:cNvPr id="1" name=""/>
+        <p:cNvGrpSpPr/>
+        <p:nvPr/>
+      </p:nvGrpSpPr>
+      <p:grpSpPr>
+        <a:xfrm>
+          <a:off x="0" y="0"/>
+          <a:ext cx="0" cy="0"/>
+          <a:chOff x="0" y="0"/>
+          <a:chExt cx="0" cy="0"/>
+        </a:xfrm>
+      </p:grpSpPr>
+      <p:sp>
+        <p:nvSpPr>
+          <p:cNvPr id="4" name="TextBox 3"/>
+          <p:cNvSpPr txBox="1"/>
+          <p:nvPr/>
+        </p:nvSpPr>
+        <p:spPr>
+          <a:xfrm>
+            <a:off x="495300" y="406400"/>
+            <a:ext cx="558800" cy="369332"/>
+          </a:xfrm>
+          <a:prstGeom prst="rect">
+            <a:avLst/>
+          </a:prstGeom>
+          <a:noFill/>
+        </p:spPr>
+        <p:txBody>
+          <a:bodyPr wrap="square" rtlCol="0">
+            <a:spAutoFit/>
+          </a:bodyPr>
+          <a:lstStyle/>
+          <a:p>
+            <a:r>
+              <a:rPr lang="en-GB" dirty="0" smtClean="0"/>
+              <a:t>38</a:t>
+            </a:r>
+            <a:endParaRPr lang="en-GB" dirty="0"/>
+          </a:p>
+        </p:txBody>
+      </p:sp>
+      <p:sp>
+        <p:nvSpPr>
+          <p:cNvPr id="5" name="Rectangle 4"/>
+          <p:cNvSpPr/>
+          <p:nvPr/>
+        </p:nvSpPr>
+        <p:spPr>
+          <a:xfrm>
+            <a:off x="4660900" y="3568700"/>
+            <a:ext cx="1524000" cy="152400"/>
+          </a:xfrm>
+          <a:prstGeom prst="rect">
+            <a:avLst/>
+          </a:prstGeom>
+          <a:solidFill>
+            <a:srgbClr val="FF0000"/>
+          </a:solidFill>
+          <a:ln>
+            <a:solidFill>
+              <a:schemeClr val="tx1"/>
+            </a:solidFill>
+          </a:ln>
+        </p:spPr>
+        <p:style>
+          <a:lnRef idx="2">
+            <a:schemeClr val="accent3">
+              <a:shade val="50000"/>
+            </a:schemeClr>
+          </a:lnRef>
+          <a:fillRef idx="1">
+            <a:schemeClr val="accent3"/>
+          </a:fillRef>
+          <a:effectRef idx="0">
+            <a:schemeClr val="accent3"/>
+          </a:effectRef>
+          <a:fontRef idx="minor">
+            <a:schemeClr val="lt1"/>
+          </a:fontRef>
+        </p:style>
+        <p:txBody>
+          <a:bodyPr rtlCol="0" anchor="ctr"/>
+          <a:lstStyle/>
+          <a:p>
+            <a:pPr algn="ctr"/>
+            <a:endParaRPr lang="en-GB"/>
+          </a:p>
+        </p:txBody>
+      </p:sp>
+      <p:sp>
+        <p:nvSpPr>
+          <p:cNvPr id="6" name="Rectangle 5"/>
+          <p:cNvSpPr/>
+          <p:nvPr/>
+        </p:nvSpPr>
+        <p:spPr>
+          <a:xfrm>
+            <a:off x="6184900" y="3568700"/>
+            <a:ext cx="1524000" cy="152400"/>
+          </a:xfrm>
+          <a:prstGeom prst="rect">
+            <a:avLst/>
+          </a:prstGeom>
+          <a:ln>
+            <a:solidFill>
+              <a:schemeClr val="tx1"/>
+            </a:solidFill>
+          </a:ln>
+        </p:spPr>
+        <p:style>
+          <a:lnRef idx="2">
+            <a:schemeClr val="accent3">
+              <a:shade val="50000"/>
+            </a:schemeClr>
+          </a:lnRef>
+          <a:fillRef idx="1">
+            <a:schemeClr val="accent3"/>
+          </a:fillRef>
+          <a:effectRef idx="0">
+            <a:schemeClr val="accent3"/>
+          </a:effectRef>
+          <a:fontRef idx="minor">
+            <a:schemeClr val="lt1"/>
+          </a:fontRef>
+        </p:style>
+        <p:txBody>
+          <a:bodyPr rtlCol="0" anchor="ctr"/>
+          <a:lstStyle/>
+          <a:p>
+            <a:pPr algn="ctr"/>
+            <a:endParaRPr lang="en-GB"/>
+          </a:p>
+        </p:txBody>
+      </p:sp>
+      <p:sp>
+        <p:nvSpPr>
+          <p:cNvPr id="7" name="Rectangle 6"/>
+          <p:cNvSpPr/>
+          <p:nvPr/>
+        </p:nvSpPr>
+        <p:spPr>
+          <a:xfrm>
+            <a:off x="3619500" y="3429000"/>
+            <a:ext cx="1041400" cy="292100"/>
+          </a:xfrm>
+          <a:prstGeom prst="rect">
+            <a:avLst/>
+          </a:prstGeom>
+          <a:solidFill>
+            <a:schemeClr val="bg2">
+              <a:lumMod val="50000"/>
+            </a:schemeClr>
+          </a:solidFill>
+          <a:ln>
+            <a:solidFill>
+              <a:schemeClr val="tx1"/>
+            </a:solidFill>
+          </a:ln>
+        </p:spPr>
+        <p:style>
+          <a:lnRef idx="2">
+            <a:schemeClr val="accent3">
+              <a:shade val="50000"/>
+            </a:schemeClr>
+          </a:lnRef>
+          <a:fillRef idx="1">
+            <a:schemeClr val="accent3"/>
+          </a:fillRef>
+          <a:effectRef idx="0">
+            <a:schemeClr val="accent3"/>
+          </a:effectRef>
+          <a:fontRef idx="minor">
+            <a:schemeClr val="lt1"/>
+          </a:fontRef>
+        </p:style>
+        <p:txBody>
+          <a:bodyPr rtlCol="0" anchor="ctr"/>
+          <a:lstStyle/>
+          <a:p>
+            <a:pPr algn="ctr"/>
+            <a:endParaRPr lang="en-GB"/>
+          </a:p>
+        </p:txBody>
+      </p:sp>
+      <p:sp>
+        <p:nvSpPr>
+          <p:cNvPr id="8" name="Rectangle 7"/>
+          <p:cNvSpPr/>
+          <p:nvPr/>
+        </p:nvSpPr>
+        <p:spPr>
+          <a:xfrm>
+            <a:off x="7708900" y="3429000"/>
+            <a:ext cx="1041400" cy="292100"/>
+          </a:xfrm>
+          <a:prstGeom prst="rect">
+            <a:avLst/>
+          </a:prstGeom>
+          <a:solidFill>
+            <a:schemeClr val="bg2">
+              <a:lumMod val="50000"/>
+            </a:schemeClr>
+          </a:solidFill>
+          <a:ln>
+            <a:solidFill>
+              <a:schemeClr val="tx1"/>
+            </a:solidFill>
+          </a:ln>
+        </p:spPr>
+        <p:style>
+          <a:lnRef idx="2">
+            <a:schemeClr val="accent3">
+              <a:shade val="50000"/>
+            </a:schemeClr>
+          </a:lnRef>
+          <a:fillRef idx="1">
+            <a:schemeClr val="accent3"/>
+          </a:fillRef>
+          <a:effectRef idx="0">
+            <a:schemeClr val="accent3"/>
+          </a:effectRef>
+          <a:fontRef idx="minor">
+            <a:schemeClr val="lt1"/>
+          </a:fontRef>
+        </p:style>
+        <p:txBody>
+          <a:bodyPr rtlCol="0" anchor="ctr"/>
+          <a:lstStyle/>
+          <a:p>
+            <a:pPr algn="ctr"/>
+            <a:endParaRPr lang="en-GB"/>
+          </a:p>
+        </p:txBody>
+      </p:sp>
+      <p:sp>
+        <p:nvSpPr>
+          <p:cNvPr id="9" name="Down Arrow 8"/>
+          <p:cNvSpPr/>
+          <p:nvPr/>
+        </p:nvSpPr>
+        <p:spPr>
+          <a:xfrm rot="10800000">
+            <a:off x="5114548" y="2202860"/>
+            <a:ext cx="647700" cy="711200"/>
+          </a:xfrm>
+          <a:prstGeom prst="downArrow">
+            <a:avLst/>
+          </a:prstGeom>
+        </p:spPr>
+        <p:style>
+          <a:lnRef idx="2">
+            <a:schemeClr val="accent1">
+              <a:shade val="50000"/>
+            </a:schemeClr>
+          </a:lnRef>
+          <a:fillRef idx="1">
+            <a:schemeClr val="accent1"/>
+          </a:fillRef>
+          <a:effectRef idx="0">
+            <a:schemeClr val="accent1"/>
+          </a:effectRef>
+          <a:fontRef idx="minor">
+            <a:schemeClr val="lt1"/>
+          </a:fontRef>
+        </p:style>
+        <p:txBody>
+          <a:bodyPr rtlCol="0" anchor="ctr"/>
+          <a:lstStyle/>
+          <a:p>
+            <a:pPr algn="ctr"/>
+            <a:endParaRPr lang="en-GB"/>
+          </a:p>
+        </p:txBody>
+      </p:sp>
+      <p:sp>
+        <p:nvSpPr>
+          <p:cNvPr id="10" name="Down Arrow 9"/>
+          <p:cNvSpPr/>
+          <p:nvPr/>
+        </p:nvSpPr>
+        <p:spPr>
+          <a:xfrm rot="10800000">
+            <a:off x="6638548" y="2202859"/>
+            <a:ext cx="647700" cy="711200"/>
+          </a:xfrm>
+          <a:prstGeom prst="downArrow">
+            <a:avLst/>
+          </a:prstGeom>
+        </p:spPr>
+        <p:style>
+          <a:lnRef idx="2">
+            <a:schemeClr val="accent1">
+              <a:shade val="50000"/>
+            </a:schemeClr>
+          </a:lnRef>
+          <a:fillRef idx="1">
+            <a:schemeClr val="accent1"/>
+          </a:fillRef>
+          <a:effectRef idx="0">
+            <a:schemeClr val="accent1"/>
+          </a:effectRef>
+          <a:fontRef idx="minor">
+            <a:schemeClr val="lt1"/>
+          </a:fontRef>
+        </p:style>
+        <p:txBody>
+          <a:bodyPr rtlCol="0" anchor="ctr"/>
+          <a:lstStyle/>
+          <a:p>
+            <a:pPr algn="ctr"/>
+            <a:endParaRPr lang="en-GB"/>
+          </a:p>
+        </p:txBody>
+      </p:sp>
+      <p:pic>
+        <p:nvPicPr>
+          <p:cNvPr id="12" name="Picture 11"/>
+          <p:cNvPicPr>
+            <a:picLocks noChangeAspect="1"/>
+          </p:cNvPicPr>
+          <p:nvPr/>
+        </p:nvPicPr>
+        <p:blipFill rotWithShape="1">
+          <a:blip r:embed="rId2"/>
+          <a:srcRect l="988" t="32725" r="83729" b="53583"/>
+          <a:stretch/>
+        </p:blipFill>
+        <p:spPr>
+          <a:xfrm>
+            <a:off x="4766918" y="3101973"/>
+            <a:ext cx="550730" cy="406401"/>
+          </a:xfrm>
+          <a:prstGeom prst="rect">
+            <a:avLst/>
+          </a:prstGeom>
+        </p:spPr>
+      </p:pic>
+      <p:pic>
+        <p:nvPicPr>
+          <p:cNvPr id="2" name="Picture 1"/>
+          <p:cNvPicPr>
+            <a:picLocks noChangeAspect="1"/>
+          </p:cNvPicPr>
+          <p:nvPr/>
+        </p:nvPicPr>
+        <p:blipFill rotWithShape="1">
+          <a:blip r:embed="rId3"/>
+          <a:srcRect l="777" t="26072" r="84361" b="63308"/>
+          <a:stretch/>
+        </p:blipFill>
+        <p:spPr>
+          <a:xfrm>
+            <a:off x="5474794" y="3117851"/>
+            <a:ext cx="604088" cy="355598"/>
+          </a:xfrm>
+          <a:prstGeom prst="rect">
+            <a:avLst/>
+          </a:prstGeom>
+        </p:spPr>
+      </p:pic>
+    </p:spTree>
+    <p:extLst>
+      <p:ext uri="{BB962C8B-B14F-4D97-AF65-F5344CB8AC3E}">
+        <p14:creationId xmlns:p14="http://schemas.microsoft.com/office/powerpoint/2010/main" val="795411877"/>
+      </p:ext>
+    </p:extLst>
+  </p:cSld>
+  <p:clrMapOvr>
+    <a:masterClrMapping/>
+  </p:clrMapOvr>
+</p:sld>
+</file>
+
+<file path=ppt/slides/slide39.xml><?xml version="1.0" encoding="utf-8"?>
+<p:sld xmlns:a="http://schemas.openxmlformats.org/drawingml/2006/main" xmlns:r="http://schemas.openxmlformats.org/officeDocument/2006/relationships" xmlns:p="http://schemas.openxmlformats.org/presentationml/2006/main">
+  <p:cSld>
+    <p:spTree>
+      <p:nvGrpSpPr>
+        <p:cNvPr id="1" name=""/>
+        <p:cNvGrpSpPr/>
+        <p:nvPr/>
+      </p:nvGrpSpPr>
+      <p:grpSpPr>
+        <a:xfrm>
+          <a:off x="0" y="0"/>
+          <a:ext cx="0" cy="0"/>
+          <a:chOff x="0" y="0"/>
+          <a:chExt cx="0" cy="0"/>
+        </a:xfrm>
+      </p:grpSpPr>
+      <p:sp>
+        <p:nvSpPr>
+          <p:cNvPr id="4" name="TextBox 3"/>
+          <p:cNvSpPr txBox="1"/>
+          <p:nvPr/>
+        </p:nvSpPr>
+        <p:spPr>
+          <a:xfrm>
+            <a:off x="495300" y="406400"/>
+            <a:ext cx="558800" cy="369332"/>
+          </a:xfrm>
+          <a:prstGeom prst="rect">
+            <a:avLst/>
+          </a:prstGeom>
+          <a:noFill/>
+        </p:spPr>
+        <p:txBody>
+          <a:bodyPr wrap="square" rtlCol="0">
+            <a:spAutoFit/>
+          </a:bodyPr>
+          <a:lstStyle/>
+          <a:p>
+            <a:r>
+              <a:rPr lang="en-GB" dirty="0" smtClean="0"/>
+              <a:t>39</a:t>
+            </a:r>
+            <a:endParaRPr lang="en-GB" dirty="0"/>
+          </a:p>
+        </p:txBody>
+      </p:sp>
+      <p:sp>
+        <p:nvSpPr>
+          <p:cNvPr id="5" name="Rectangle 4"/>
+          <p:cNvSpPr/>
+          <p:nvPr/>
+        </p:nvSpPr>
+        <p:spPr>
+          <a:xfrm>
+            <a:off x="4660900" y="3568700"/>
+            <a:ext cx="1524000" cy="152400"/>
+          </a:xfrm>
+          <a:prstGeom prst="rect">
+            <a:avLst/>
+          </a:prstGeom>
+          <a:ln>
+            <a:solidFill>
+              <a:schemeClr val="tx1"/>
+            </a:solidFill>
+          </a:ln>
+        </p:spPr>
+        <p:style>
+          <a:lnRef idx="2">
+            <a:schemeClr val="accent3">
+              <a:shade val="50000"/>
+            </a:schemeClr>
+          </a:lnRef>
+          <a:fillRef idx="1">
+            <a:schemeClr val="accent3"/>
+          </a:fillRef>
+          <a:effectRef idx="0">
+            <a:schemeClr val="accent3"/>
+          </a:effectRef>
+          <a:fontRef idx="minor">
+            <a:schemeClr val="lt1"/>
+          </a:fontRef>
+        </p:style>
+        <p:txBody>
+          <a:bodyPr rtlCol="0" anchor="ctr"/>
+          <a:lstStyle/>
+          <a:p>
+            <a:pPr algn="ctr"/>
+            <a:endParaRPr lang="en-GB"/>
+          </a:p>
+        </p:txBody>
+      </p:sp>
+      <p:sp>
+        <p:nvSpPr>
+          <p:cNvPr id="6" name="Rectangle 5"/>
+          <p:cNvSpPr/>
+          <p:nvPr/>
+        </p:nvSpPr>
+        <p:spPr>
+          <a:xfrm>
+            <a:off x="6184900" y="3568700"/>
+            <a:ext cx="1524000" cy="152400"/>
+          </a:xfrm>
+          <a:prstGeom prst="rect">
+            <a:avLst/>
+          </a:prstGeom>
+          <a:ln>
+            <a:solidFill>
+              <a:schemeClr val="tx1"/>
+            </a:solidFill>
+          </a:ln>
+        </p:spPr>
+        <p:style>
+          <a:lnRef idx="2">
+            <a:schemeClr val="accent3">
+              <a:shade val="50000"/>
+            </a:schemeClr>
+          </a:lnRef>
+          <a:fillRef idx="1">
+            <a:schemeClr val="accent3"/>
+          </a:fillRef>
+          <a:effectRef idx="0">
+            <a:schemeClr val="accent3"/>
+          </a:effectRef>
+          <a:fontRef idx="minor">
+            <a:schemeClr val="lt1"/>
+          </a:fontRef>
+        </p:style>
+        <p:txBody>
+          <a:bodyPr rtlCol="0" anchor="ctr"/>
+          <a:lstStyle/>
+          <a:p>
+            <a:pPr algn="ctr"/>
+            <a:endParaRPr lang="en-GB"/>
+          </a:p>
+        </p:txBody>
+      </p:sp>
+      <p:sp>
+        <p:nvSpPr>
+          <p:cNvPr id="7" name="Rectangle 6"/>
+          <p:cNvSpPr/>
+          <p:nvPr/>
+        </p:nvSpPr>
+        <p:spPr>
+          <a:xfrm>
+            <a:off x="2730500" y="3429000"/>
+            <a:ext cx="1041400" cy="292100"/>
+          </a:xfrm>
+          <a:prstGeom prst="rect">
+            <a:avLst/>
+          </a:prstGeom>
+          <a:solidFill>
+            <a:schemeClr val="bg2">
+              <a:lumMod val="50000"/>
+            </a:schemeClr>
+          </a:solidFill>
+          <a:ln>
+            <a:solidFill>
+              <a:schemeClr val="tx1"/>
+            </a:solidFill>
+          </a:ln>
+        </p:spPr>
+        <p:style>
+          <a:lnRef idx="2">
+            <a:schemeClr val="accent3">
+              <a:shade val="50000"/>
+            </a:schemeClr>
+          </a:lnRef>
+          <a:fillRef idx="1">
+            <a:schemeClr val="accent3"/>
+          </a:fillRef>
+          <a:effectRef idx="0">
+            <a:schemeClr val="accent3"/>
+          </a:effectRef>
+          <a:fontRef idx="minor">
+            <a:schemeClr val="lt1"/>
+          </a:fontRef>
+        </p:style>
+        <p:txBody>
+          <a:bodyPr rtlCol="0" anchor="ctr"/>
+          <a:lstStyle/>
+          <a:p>
+            <a:pPr algn="ctr"/>
+            <a:endParaRPr lang="en-GB"/>
+          </a:p>
+        </p:txBody>
+      </p:sp>
+      <p:sp>
+        <p:nvSpPr>
+          <p:cNvPr id="8" name="Rectangle 7"/>
+          <p:cNvSpPr/>
+          <p:nvPr/>
+        </p:nvSpPr>
+        <p:spPr>
+          <a:xfrm>
+            <a:off x="7708900" y="3429000"/>
+            <a:ext cx="1041400" cy="292100"/>
+          </a:xfrm>
+          <a:prstGeom prst="rect">
+            <a:avLst/>
+          </a:prstGeom>
+          <a:solidFill>
+            <a:schemeClr val="bg2">
+              <a:lumMod val="50000"/>
+            </a:schemeClr>
+          </a:solidFill>
+          <a:ln>
+            <a:solidFill>
+              <a:schemeClr val="tx1"/>
+            </a:solidFill>
+          </a:ln>
+        </p:spPr>
+        <p:style>
+          <a:lnRef idx="2">
+            <a:schemeClr val="accent3">
+              <a:shade val="50000"/>
+            </a:schemeClr>
+          </a:lnRef>
+          <a:fillRef idx="1">
+            <a:schemeClr val="accent3"/>
+          </a:fillRef>
+          <a:effectRef idx="0">
+            <a:schemeClr val="accent3"/>
+          </a:effectRef>
+          <a:fontRef idx="minor">
+            <a:schemeClr val="lt1"/>
+          </a:fontRef>
+        </p:style>
+        <p:txBody>
+          <a:bodyPr rtlCol="0" anchor="ctr"/>
+          <a:lstStyle/>
+          <a:p>
+            <a:pPr algn="ctr"/>
+            <a:endParaRPr lang="en-GB"/>
+          </a:p>
+        </p:txBody>
+      </p:sp>
+      <p:sp>
+        <p:nvSpPr>
+          <p:cNvPr id="9" name="Down Arrow 8"/>
+          <p:cNvSpPr/>
+          <p:nvPr/>
+        </p:nvSpPr>
+        <p:spPr>
+          <a:xfrm rot="10800000">
+            <a:off x="5137150" y="2432051"/>
+            <a:ext cx="647700" cy="711200"/>
+          </a:xfrm>
+          <a:prstGeom prst="downArrow">
+            <a:avLst/>
+          </a:prstGeom>
+        </p:spPr>
+        <p:style>
+          <a:lnRef idx="2">
+            <a:schemeClr val="accent1">
+              <a:shade val="50000"/>
+            </a:schemeClr>
+          </a:lnRef>
+          <a:fillRef idx="1">
+            <a:schemeClr val="accent1"/>
+          </a:fillRef>
+          <a:effectRef idx="0">
+            <a:schemeClr val="accent1"/>
+          </a:effectRef>
+          <a:fontRef idx="minor">
+            <a:schemeClr val="lt1"/>
+          </a:fontRef>
+        </p:style>
+        <p:txBody>
+          <a:bodyPr rtlCol="0" anchor="ctr"/>
+          <a:lstStyle/>
+          <a:p>
+            <a:pPr algn="ctr"/>
+            <a:endParaRPr lang="en-GB"/>
+          </a:p>
+        </p:txBody>
+      </p:sp>
+      <p:sp>
+        <p:nvSpPr>
+          <p:cNvPr id="10" name="Down Arrow 9"/>
+          <p:cNvSpPr/>
+          <p:nvPr/>
+        </p:nvSpPr>
+        <p:spPr>
+          <a:xfrm rot="10800000">
+            <a:off x="6661150" y="2432050"/>
+            <a:ext cx="647700" cy="711200"/>
+          </a:xfrm>
+          <a:prstGeom prst="downArrow">
+            <a:avLst/>
+          </a:prstGeom>
+        </p:spPr>
+        <p:style>
+          <a:lnRef idx="2">
+            <a:schemeClr val="accent1">
+              <a:shade val="50000"/>
+            </a:schemeClr>
+          </a:lnRef>
+          <a:fillRef idx="1">
+            <a:schemeClr val="accent1"/>
+          </a:fillRef>
+          <a:effectRef idx="0">
+            <a:schemeClr val="accent1"/>
+          </a:effectRef>
+          <a:fontRef idx="minor">
+            <a:schemeClr val="lt1"/>
+          </a:fontRef>
+        </p:style>
+        <p:txBody>
+          <a:bodyPr rtlCol="0" anchor="ctr"/>
+          <a:lstStyle/>
+          <a:p>
+            <a:pPr algn="ctr"/>
+            <a:endParaRPr lang="en-GB"/>
+          </a:p>
+        </p:txBody>
+      </p:sp>
+      <p:sp>
+        <p:nvSpPr>
+          <p:cNvPr id="11" name="Rectangle 10"/>
+          <p:cNvSpPr/>
+          <p:nvPr/>
+        </p:nvSpPr>
+        <p:spPr>
+          <a:xfrm>
+            <a:off x="3771900" y="3568700"/>
+            <a:ext cx="889000" cy="152400"/>
+          </a:xfrm>
+          <a:prstGeom prst="rect">
+            <a:avLst/>
+          </a:prstGeom>
+          <a:solidFill>
+            <a:srgbClr val="C00000"/>
+          </a:solidFill>
+          <a:ln>
+            <a:solidFill>
+              <a:schemeClr val="tx1"/>
+            </a:solidFill>
+          </a:ln>
+        </p:spPr>
+        <p:style>
+          <a:lnRef idx="2">
+            <a:schemeClr val="accent3">
+              <a:shade val="50000"/>
+            </a:schemeClr>
+          </a:lnRef>
+          <a:fillRef idx="1">
+            <a:schemeClr val="accent3"/>
+          </a:fillRef>
+          <a:effectRef idx="0">
+            <a:schemeClr val="accent3"/>
+          </a:effectRef>
+          <a:fontRef idx="minor">
+            <a:schemeClr val="lt1"/>
+          </a:fontRef>
+        </p:style>
+        <p:txBody>
+          <a:bodyPr rtlCol="0" anchor="ctr"/>
+          <a:lstStyle/>
+          <a:p>
+            <a:pPr algn="ctr"/>
+            <a:endParaRPr lang="en-GB"/>
+          </a:p>
+        </p:txBody>
+      </p:sp>
+      <p:pic>
+        <p:nvPicPr>
+          <p:cNvPr id="13" name="Picture 12"/>
+          <p:cNvPicPr>
+            <a:picLocks noChangeAspect="1"/>
+          </p:cNvPicPr>
+          <p:nvPr/>
+        </p:nvPicPr>
+        <p:blipFill rotWithShape="1">
+          <a:blip r:embed="rId2"/>
+          <a:srcRect l="988" t="32725" r="83729" b="53583"/>
+          <a:stretch/>
+        </p:blipFill>
+        <p:spPr>
+          <a:xfrm>
+            <a:off x="3941035" y="3022599"/>
+            <a:ext cx="550730" cy="406401"/>
+          </a:xfrm>
+          <a:prstGeom prst="rect">
+            <a:avLst/>
+          </a:prstGeom>
+        </p:spPr>
+      </p:pic>
+    </p:spTree>
+    <p:extLst>
+      <p:ext uri="{BB962C8B-B14F-4D97-AF65-F5344CB8AC3E}">
+        <p14:creationId xmlns:p14="http://schemas.microsoft.com/office/powerpoint/2010/main" val="1516909667"/>
+      </p:ext>
+    </p:extLst>
+  </p:cSld>
+  <p:clrMapOvr>
+    <a:masterClrMapping/>
+  </p:clrMapOvr>
+</p:sld>
+</file>
+
 <file path=ppt/slides/slide4.xml><?xml version="1.0" encoding="utf-8"?>
 <p:sld xmlns:a="http://schemas.openxmlformats.org/drawingml/2006/main" xmlns:r="http://schemas.openxmlformats.org/officeDocument/2006/relationships" xmlns:p="http://schemas.openxmlformats.org/presentationml/2006/main">
   <p:cSld>
@@ -11474,6 +13334,506 @@
     <p:extLst>
       <p:ext uri="{BB962C8B-B14F-4D97-AF65-F5344CB8AC3E}">
         <p14:creationId xmlns:p14="http://schemas.microsoft.com/office/powerpoint/2010/main" val="1351559909"/>
+      </p:ext>
+    </p:extLst>
+  </p:cSld>
+  <p:clrMapOvr>
+    <a:masterClrMapping/>
+  </p:clrMapOvr>
+</p:sld>
+</file>
+
+<file path=ppt/slides/slide40.xml><?xml version="1.0" encoding="utf-8"?>
+<p:sld xmlns:a="http://schemas.openxmlformats.org/drawingml/2006/main" xmlns:r="http://schemas.openxmlformats.org/officeDocument/2006/relationships" xmlns:p="http://schemas.openxmlformats.org/presentationml/2006/main">
+  <p:cSld>
+    <p:spTree>
+      <p:nvGrpSpPr>
+        <p:cNvPr id="1" name=""/>
+        <p:cNvGrpSpPr/>
+        <p:nvPr/>
+      </p:nvGrpSpPr>
+      <p:grpSpPr>
+        <a:xfrm>
+          <a:off x="0" y="0"/>
+          <a:ext cx="0" cy="0"/>
+          <a:chOff x="0" y="0"/>
+          <a:chExt cx="0" cy="0"/>
+        </a:xfrm>
+      </p:grpSpPr>
+      <p:sp>
+        <p:nvSpPr>
+          <p:cNvPr id="4" name="TextBox 3"/>
+          <p:cNvSpPr txBox="1"/>
+          <p:nvPr/>
+        </p:nvSpPr>
+        <p:spPr>
+          <a:xfrm>
+            <a:off x="464304" y="406400"/>
+            <a:ext cx="558800" cy="369332"/>
+          </a:xfrm>
+          <a:prstGeom prst="rect">
+            <a:avLst/>
+          </a:prstGeom>
+          <a:noFill/>
+        </p:spPr>
+        <p:txBody>
+          <a:bodyPr wrap="square" rtlCol="0">
+            <a:spAutoFit/>
+          </a:bodyPr>
+          <a:lstStyle/>
+          <a:p>
+            <a:r>
+              <a:rPr lang="en-GB" dirty="0" smtClean="0"/>
+              <a:t>40</a:t>
+            </a:r>
+            <a:endParaRPr lang="en-GB" dirty="0"/>
+          </a:p>
+        </p:txBody>
+      </p:sp>
+      <p:sp>
+        <p:nvSpPr>
+          <p:cNvPr id="5" name="Rectangle 4"/>
+          <p:cNvSpPr/>
+          <p:nvPr/>
+        </p:nvSpPr>
+        <p:spPr>
+          <a:xfrm>
+            <a:off x="4577166" y="3995980"/>
+            <a:ext cx="1524000" cy="152400"/>
+          </a:xfrm>
+          <a:prstGeom prst="rect">
+            <a:avLst/>
+          </a:prstGeom>
+          <a:ln>
+            <a:solidFill>
+              <a:schemeClr val="tx1"/>
+            </a:solidFill>
+          </a:ln>
+        </p:spPr>
+        <p:style>
+          <a:lnRef idx="2">
+            <a:schemeClr val="accent3">
+              <a:shade val="50000"/>
+            </a:schemeClr>
+          </a:lnRef>
+          <a:fillRef idx="1">
+            <a:schemeClr val="accent3"/>
+          </a:fillRef>
+          <a:effectRef idx="0">
+            <a:schemeClr val="accent3"/>
+          </a:effectRef>
+          <a:fontRef idx="minor">
+            <a:schemeClr val="lt1"/>
+          </a:fontRef>
+        </p:style>
+        <p:txBody>
+          <a:bodyPr rtlCol="0" anchor="ctr"/>
+          <a:lstStyle/>
+          <a:p>
+            <a:pPr algn="ctr"/>
+            <a:endParaRPr lang="en-GB"/>
+          </a:p>
+        </p:txBody>
+      </p:sp>
+      <p:sp>
+        <p:nvSpPr>
+          <p:cNvPr id="6" name="Rectangle 5"/>
+          <p:cNvSpPr/>
+          <p:nvPr/>
+        </p:nvSpPr>
+        <p:spPr>
+          <a:xfrm>
+            <a:off x="6101166" y="3995980"/>
+            <a:ext cx="1524000" cy="152400"/>
+          </a:xfrm>
+          <a:prstGeom prst="rect">
+            <a:avLst/>
+          </a:prstGeom>
+          <a:ln>
+            <a:solidFill>
+              <a:schemeClr val="tx1"/>
+            </a:solidFill>
+          </a:ln>
+        </p:spPr>
+        <p:style>
+          <a:lnRef idx="2">
+            <a:schemeClr val="accent3">
+              <a:shade val="50000"/>
+            </a:schemeClr>
+          </a:lnRef>
+          <a:fillRef idx="1">
+            <a:schemeClr val="accent3"/>
+          </a:fillRef>
+          <a:effectRef idx="0">
+            <a:schemeClr val="accent3"/>
+          </a:effectRef>
+          <a:fontRef idx="minor">
+            <a:schemeClr val="lt1"/>
+          </a:fontRef>
+        </p:style>
+        <p:txBody>
+          <a:bodyPr rtlCol="0" anchor="ctr"/>
+          <a:lstStyle/>
+          <a:p>
+            <a:pPr algn="ctr"/>
+            <a:endParaRPr lang="en-GB"/>
+          </a:p>
+        </p:txBody>
+      </p:sp>
+      <p:sp>
+        <p:nvSpPr>
+          <p:cNvPr id="7" name="Rectangle 6"/>
+          <p:cNvSpPr/>
+          <p:nvPr/>
+        </p:nvSpPr>
+        <p:spPr>
+          <a:xfrm>
+            <a:off x="2011766" y="3856280"/>
+            <a:ext cx="1041400" cy="292100"/>
+          </a:xfrm>
+          <a:prstGeom prst="rect">
+            <a:avLst/>
+          </a:prstGeom>
+          <a:solidFill>
+            <a:schemeClr val="bg2">
+              <a:lumMod val="50000"/>
+            </a:schemeClr>
+          </a:solidFill>
+          <a:ln>
+            <a:solidFill>
+              <a:schemeClr val="tx1"/>
+            </a:solidFill>
+          </a:ln>
+        </p:spPr>
+        <p:style>
+          <a:lnRef idx="2">
+            <a:schemeClr val="accent3">
+              <a:shade val="50000"/>
+            </a:schemeClr>
+          </a:lnRef>
+          <a:fillRef idx="1">
+            <a:schemeClr val="accent3"/>
+          </a:fillRef>
+          <a:effectRef idx="0">
+            <a:schemeClr val="accent3"/>
+          </a:effectRef>
+          <a:fontRef idx="minor">
+            <a:schemeClr val="lt1"/>
+          </a:fontRef>
+        </p:style>
+        <p:txBody>
+          <a:bodyPr rtlCol="0" anchor="ctr"/>
+          <a:lstStyle/>
+          <a:p>
+            <a:pPr algn="ctr"/>
+            <a:endParaRPr lang="en-GB"/>
+          </a:p>
+        </p:txBody>
+      </p:sp>
+      <p:sp>
+        <p:nvSpPr>
+          <p:cNvPr id="8" name="Rectangle 7"/>
+          <p:cNvSpPr/>
+          <p:nvPr/>
+        </p:nvSpPr>
+        <p:spPr>
+          <a:xfrm>
+            <a:off x="9149166" y="3856280"/>
+            <a:ext cx="1041400" cy="292100"/>
+          </a:xfrm>
+          <a:prstGeom prst="rect">
+            <a:avLst/>
+          </a:prstGeom>
+          <a:solidFill>
+            <a:schemeClr val="bg2">
+              <a:lumMod val="50000"/>
+            </a:schemeClr>
+          </a:solidFill>
+          <a:ln>
+            <a:solidFill>
+              <a:schemeClr val="tx1"/>
+            </a:solidFill>
+          </a:ln>
+        </p:spPr>
+        <p:style>
+          <a:lnRef idx="2">
+            <a:schemeClr val="accent3">
+              <a:shade val="50000"/>
+            </a:schemeClr>
+          </a:lnRef>
+          <a:fillRef idx="1">
+            <a:schemeClr val="accent3"/>
+          </a:fillRef>
+          <a:effectRef idx="0">
+            <a:schemeClr val="accent3"/>
+          </a:effectRef>
+          <a:fontRef idx="minor">
+            <a:schemeClr val="lt1"/>
+          </a:fontRef>
+        </p:style>
+        <p:txBody>
+          <a:bodyPr rtlCol="0" anchor="ctr"/>
+          <a:lstStyle/>
+          <a:p>
+            <a:pPr algn="ctr"/>
+            <a:endParaRPr lang="en-GB"/>
+          </a:p>
+        </p:txBody>
+      </p:sp>
+      <p:sp>
+        <p:nvSpPr>
+          <p:cNvPr id="9" name="Down Arrow 8"/>
+          <p:cNvSpPr/>
+          <p:nvPr/>
+        </p:nvSpPr>
+        <p:spPr>
+          <a:xfrm rot="10800000">
+            <a:off x="6539316" y="2859330"/>
+            <a:ext cx="647700" cy="711200"/>
+          </a:xfrm>
+          <a:prstGeom prst="downArrow">
+            <a:avLst/>
+          </a:prstGeom>
+        </p:spPr>
+        <p:style>
+          <a:lnRef idx="2">
+            <a:schemeClr val="accent1">
+              <a:shade val="50000"/>
+            </a:schemeClr>
+          </a:lnRef>
+          <a:fillRef idx="1">
+            <a:schemeClr val="accent1"/>
+          </a:fillRef>
+          <a:effectRef idx="0">
+            <a:schemeClr val="accent1"/>
+          </a:effectRef>
+          <a:fontRef idx="minor">
+            <a:schemeClr val="lt1"/>
+          </a:fontRef>
+        </p:style>
+        <p:txBody>
+          <a:bodyPr rtlCol="0" anchor="ctr"/>
+          <a:lstStyle/>
+          <a:p>
+            <a:pPr algn="ctr"/>
+            <a:endParaRPr lang="en-GB"/>
+          </a:p>
+        </p:txBody>
+      </p:sp>
+      <p:sp>
+        <p:nvSpPr>
+          <p:cNvPr id="10" name="Down Arrow 9"/>
+          <p:cNvSpPr/>
+          <p:nvPr/>
+        </p:nvSpPr>
+        <p:spPr>
+          <a:xfrm rot="10800000">
+            <a:off x="8063316" y="2859329"/>
+            <a:ext cx="647700" cy="711200"/>
+          </a:xfrm>
+          <a:prstGeom prst="downArrow">
+            <a:avLst/>
+          </a:prstGeom>
+        </p:spPr>
+        <p:style>
+          <a:lnRef idx="2">
+            <a:schemeClr val="accent1">
+              <a:shade val="50000"/>
+            </a:schemeClr>
+          </a:lnRef>
+          <a:fillRef idx="1">
+            <a:schemeClr val="accent1"/>
+          </a:fillRef>
+          <a:effectRef idx="0">
+            <a:schemeClr val="accent1"/>
+          </a:effectRef>
+          <a:fontRef idx="minor">
+            <a:schemeClr val="lt1"/>
+          </a:fontRef>
+        </p:style>
+        <p:txBody>
+          <a:bodyPr rtlCol="0" anchor="ctr"/>
+          <a:lstStyle/>
+          <a:p>
+            <a:pPr algn="ctr"/>
+            <a:endParaRPr lang="en-GB"/>
+          </a:p>
+        </p:txBody>
+      </p:sp>
+      <p:sp>
+        <p:nvSpPr>
+          <p:cNvPr id="11" name="Rectangle 10"/>
+          <p:cNvSpPr/>
+          <p:nvPr/>
+        </p:nvSpPr>
+        <p:spPr>
+          <a:xfrm>
+            <a:off x="7625166" y="3995980"/>
+            <a:ext cx="1524000" cy="152400"/>
+          </a:xfrm>
+          <a:prstGeom prst="rect">
+            <a:avLst/>
+          </a:prstGeom>
+          <a:ln>
+            <a:solidFill>
+              <a:schemeClr val="tx1"/>
+            </a:solidFill>
+          </a:ln>
+        </p:spPr>
+        <p:style>
+          <a:lnRef idx="2">
+            <a:schemeClr val="accent3">
+              <a:shade val="50000"/>
+            </a:schemeClr>
+          </a:lnRef>
+          <a:fillRef idx="1">
+            <a:schemeClr val="accent3"/>
+          </a:fillRef>
+          <a:effectRef idx="0">
+            <a:schemeClr val="accent3"/>
+          </a:effectRef>
+          <a:fontRef idx="minor">
+            <a:schemeClr val="lt1"/>
+          </a:fontRef>
+        </p:style>
+        <p:txBody>
+          <a:bodyPr rtlCol="0" anchor="ctr"/>
+          <a:lstStyle/>
+          <a:p>
+            <a:pPr algn="ctr"/>
+            <a:endParaRPr lang="en-GB"/>
+          </a:p>
+        </p:txBody>
+      </p:sp>
+      <p:sp>
+        <p:nvSpPr>
+          <p:cNvPr id="12" name="Down Arrow 11"/>
+          <p:cNvSpPr/>
+          <p:nvPr/>
+        </p:nvSpPr>
+        <p:spPr>
+          <a:xfrm rot="10800000">
+            <a:off x="5015316" y="2859329"/>
+            <a:ext cx="647700" cy="711200"/>
+          </a:xfrm>
+          <a:prstGeom prst="downArrow">
+            <a:avLst/>
+          </a:prstGeom>
+        </p:spPr>
+        <p:style>
+          <a:lnRef idx="2">
+            <a:schemeClr val="accent1">
+              <a:shade val="50000"/>
+            </a:schemeClr>
+          </a:lnRef>
+          <a:fillRef idx="1">
+            <a:schemeClr val="accent1"/>
+          </a:fillRef>
+          <a:effectRef idx="0">
+            <a:schemeClr val="accent1"/>
+          </a:effectRef>
+          <a:fontRef idx="minor">
+            <a:schemeClr val="lt1"/>
+          </a:fontRef>
+        </p:style>
+        <p:txBody>
+          <a:bodyPr rtlCol="0" anchor="ctr"/>
+          <a:lstStyle/>
+          <a:p>
+            <a:pPr algn="ctr"/>
+            <a:endParaRPr lang="en-GB"/>
+          </a:p>
+        </p:txBody>
+      </p:sp>
+      <p:sp>
+        <p:nvSpPr>
+          <p:cNvPr id="13" name="Rectangle 12"/>
+          <p:cNvSpPr/>
+          <p:nvPr/>
+        </p:nvSpPr>
+        <p:spPr>
+          <a:xfrm>
+            <a:off x="3053166" y="3995980"/>
+            <a:ext cx="1524000" cy="152400"/>
+          </a:xfrm>
+          <a:prstGeom prst="rect">
+            <a:avLst/>
+          </a:prstGeom>
+          <a:ln>
+            <a:solidFill>
+              <a:schemeClr val="tx1"/>
+            </a:solidFill>
+          </a:ln>
+        </p:spPr>
+        <p:style>
+          <a:lnRef idx="2">
+            <a:schemeClr val="accent3">
+              <a:shade val="50000"/>
+            </a:schemeClr>
+          </a:lnRef>
+          <a:fillRef idx="1">
+            <a:schemeClr val="accent3"/>
+          </a:fillRef>
+          <a:effectRef idx="0">
+            <a:schemeClr val="accent3"/>
+          </a:effectRef>
+          <a:fontRef idx="minor">
+            <a:schemeClr val="lt1"/>
+          </a:fontRef>
+        </p:style>
+        <p:txBody>
+          <a:bodyPr rtlCol="0" anchor="ctr"/>
+          <a:lstStyle/>
+          <a:p>
+            <a:pPr algn="ctr"/>
+            <a:endParaRPr lang="en-GB"/>
+          </a:p>
+        </p:txBody>
+      </p:sp>
+      <p:sp>
+        <p:nvSpPr>
+          <p:cNvPr id="14" name="Down Arrow 13"/>
+          <p:cNvSpPr/>
+          <p:nvPr/>
+        </p:nvSpPr>
+        <p:spPr>
+          <a:xfrm rot="10800000">
+            <a:off x="3491316" y="2859329"/>
+            <a:ext cx="647700" cy="711200"/>
+          </a:xfrm>
+          <a:prstGeom prst="downArrow">
+            <a:avLst/>
+          </a:prstGeom>
+        </p:spPr>
+        <p:style>
+          <a:lnRef idx="2">
+            <a:schemeClr val="accent1">
+              <a:shade val="50000"/>
+            </a:schemeClr>
+          </a:lnRef>
+          <a:fillRef idx="1">
+            <a:schemeClr val="accent1"/>
+          </a:fillRef>
+          <a:effectRef idx="0">
+            <a:schemeClr val="accent1"/>
+          </a:effectRef>
+          <a:fontRef idx="minor">
+            <a:schemeClr val="lt1"/>
+          </a:fontRef>
+        </p:style>
+        <p:txBody>
+          <a:bodyPr rtlCol="0" anchor="ctr"/>
+          <a:lstStyle/>
+          <a:p>
+            <a:pPr algn="ctr"/>
+            <a:endParaRPr lang="en-GB"/>
+          </a:p>
+        </p:txBody>
+      </p:sp>
+    </p:spTree>
+    <p:extLst>
+      <p:ext uri="{BB962C8B-B14F-4D97-AF65-F5344CB8AC3E}">
+        <p14:creationId xmlns:p14="http://schemas.microsoft.com/office/powerpoint/2010/main" val="2662204858"/>
       </p:ext>
     </p:extLst>
   </p:cSld>
@@ -11658,6 +14018,82 @@
           </a:p>
         </p:txBody>
       </p:sp>
+      <p:sp>
+        <p:nvSpPr>
+          <p:cNvPr id="6" name="TextBox 5"/>
+          <p:cNvSpPr txBox="1"/>
+          <p:nvPr/>
+        </p:nvSpPr>
+        <p:spPr>
+          <a:xfrm>
+            <a:off x="1135896" y="1767668"/>
+            <a:ext cx="1212097" cy="369332"/>
+          </a:xfrm>
+          <a:prstGeom prst="rect">
+            <a:avLst/>
+          </a:prstGeom>
+          <a:noFill/>
+        </p:spPr>
+        <p:txBody>
+          <a:bodyPr wrap="square" rtlCol="0">
+            <a:spAutoFit/>
+          </a:bodyPr>
+          <a:lstStyle/>
+          <a:p>
+            <a:r>
+              <a:rPr lang="en-GB" dirty="0" smtClean="0"/>
+              <a:t>Cycle Way</a:t>
+            </a:r>
+            <a:endParaRPr lang="en-GB" dirty="0"/>
+          </a:p>
+        </p:txBody>
+      </p:sp>
+      <p:pic>
+        <p:nvPicPr>
+          <p:cNvPr id="7" name="Picture 6"/>
+          <p:cNvPicPr>
+            <a:picLocks noChangeAspect="1"/>
+          </p:cNvPicPr>
+          <p:nvPr/>
+        </p:nvPicPr>
+        <p:blipFill rotWithShape="1">
+          <a:blip r:embed="rId2"/>
+          <a:srcRect l="988" t="32725" r="83729" b="53583"/>
+          <a:stretch/>
+        </p:blipFill>
+        <p:spPr>
+          <a:xfrm>
+            <a:off x="4984750" y="2924175"/>
+            <a:ext cx="550730" cy="406401"/>
+          </a:xfrm>
+          <a:prstGeom prst="rect">
+            <a:avLst/>
+          </a:prstGeom>
+        </p:spPr>
+      </p:pic>
+      <p:pic>
+        <p:nvPicPr>
+          <p:cNvPr id="8" name="Picture 7"/>
+          <p:cNvPicPr>
+            <a:picLocks noChangeAspect="1"/>
+          </p:cNvPicPr>
+          <p:nvPr/>
+        </p:nvPicPr>
+        <p:blipFill rotWithShape="1">
+          <a:blip r:embed="rId2"/>
+          <a:srcRect l="988" t="32725" r="83729" b="53583"/>
+          <a:stretch/>
+        </p:blipFill>
+        <p:spPr>
+          <a:xfrm>
+            <a:off x="5861050" y="2924175"/>
+            <a:ext cx="550730" cy="406401"/>
+          </a:xfrm>
+          <a:prstGeom prst="rect">
+            <a:avLst/>
+          </a:prstGeom>
+        </p:spPr>
+      </p:pic>
     </p:spTree>
     <p:extLst>
       <p:ext uri="{BB962C8B-B14F-4D97-AF65-F5344CB8AC3E}">
@@ -11929,7 +14365,7 @@
         <p:spPr>
           <a:xfrm>
             <a:off x="3124200" y="1968500"/>
-            <a:ext cx="6083300" cy="369332"/>
+            <a:ext cx="6083300" cy="1569660"/>
           </a:xfrm>
           <a:prstGeom prst="rect">
             <a:avLst/>
@@ -11944,10 +14380,18 @@
           <a:p>
             <a:pPr algn="ctr"/>
             <a:r>
-              <a:rPr lang="en-GB" dirty="0" smtClean="0"/>
+              <a:rPr lang="en-GB" sz="9600" dirty="0" smtClean="0">
+                <a:solidFill>
+                  <a:srgbClr val="FF0000"/>
+                </a:solidFill>
+              </a:rPr>
               <a:t>Errors</a:t>
             </a:r>
-            <a:endParaRPr lang="en-GB" dirty="0"/>
+            <a:endParaRPr lang="en-GB" sz="9600" dirty="0">
+              <a:solidFill>
+                <a:srgbClr val="FF0000"/>
+              </a:solidFill>
+            </a:endParaRPr>
           </a:p>
         </p:txBody>
       </p:sp>

</xml_diff>